<commit_message>
Take smainchain comments into account
</commit_message>
<xml_diff>
--- a/KernelDeveloperGuide/pptx/KernelSecurityPolicyManagerFlow.pptx
+++ b/KernelDeveloperGuide/pptx/KernelSecurityPolicyManagerFlow.pptx
@@ -4954,7 +4954,7 @@
           <a:p>
             <a:fld id="{025BB511-135A-4023-9BA9-4F1E5285ED4F}" type="datetimeFigureOut">
               <a:rPr lang="en-US" smtClean="0"/>
-              <a:t>4/17/2024</a:t>
+              <a:t>4/24/2024</a:t>
             </a:fld>
             <a:endParaRPr lang="en-US"/>
           </a:p>
@@ -5152,7 +5152,7 @@
           <a:p>
             <a:fld id="{025BB511-135A-4023-9BA9-4F1E5285ED4F}" type="datetimeFigureOut">
               <a:rPr lang="en-US" smtClean="0"/>
-              <a:t>4/17/2024</a:t>
+              <a:t>4/24/2024</a:t>
             </a:fld>
             <a:endParaRPr lang="en-US"/>
           </a:p>
@@ -7758,7 +7758,7 @@
         </p:nvSpPr>
         <p:spPr>
           <a:xfrm>
-            <a:off x="350985" y="3428419"/>
+            <a:off x="352984" y="3429654"/>
             <a:ext cx="11510900" cy="1951197"/>
           </a:xfrm>
           <a:prstGeom prst="roundRect">
@@ -7955,7 +7955,7 @@
         <p:spPr>
           <a:xfrm>
             <a:off x="567615" y="4579315"/>
-            <a:ext cx="11051013" cy="584538"/>
+            <a:ext cx="9632095" cy="584538"/>
           </a:xfrm>
           <a:prstGeom prst="roundRect">
             <a:avLst/>
@@ -7990,20 +7990,20 @@
             <a:pPr algn="ctr"/>
             <a:r>
               <a:rPr lang="en-US" sz="1400" dirty="0">
-                <a:latin typeface="Source Sans Pro Light" panose="020B0403030403020204" pitchFamily="34" charset="0"/>
-                <a:ea typeface="Source Sans Pro Light" panose="020B0403030403020204" pitchFamily="34" charset="0"/>
+                <a:latin typeface="Source Sans Pro" panose="020B0503030403020204" pitchFamily="34" charset="0"/>
+                <a:ea typeface="Source Sans Pro" panose="020B0503030403020204" pitchFamily="34" charset="0"/>
               </a:rPr>
-              <a:t>Authorized permission map</a:t>
+              <a:t>Permission map</a:t>
             </a:r>
           </a:p>
         </p:txBody>
       </p:sp>
       <p:sp>
         <p:nvSpPr>
-          <p:cNvPr id="7" name="Rectangle: Rounded Corners 6">
+          <p:cNvPr id="12" name="Rectangle: Rounded Corners 11">
             <a:extLst>
               <a:ext uri="{FF2B5EF4-FFF2-40B4-BE49-F238E27FC236}">
-                <a16:creationId xmlns:a16="http://schemas.microsoft.com/office/drawing/2014/main" id="{6D5F0507-8B63-7BC1-801C-E47B5D118A4D}"/>
+                <a16:creationId xmlns:a16="http://schemas.microsoft.com/office/drawing/2014/main" id="{1C785E8C-F7EC-A41C-98FC-ED11BF22C78E}"/>
               </a:ext>
             </a:extLst>
           </p:cNvPr>
@@ -8012,14 +8012,123 @@
         </p:nvSpPr>
         <p:spPr>
           <a:xfrm>
-            <a:off x="572267" y="2123577"/>
-            <a:ext cx="2867712" cy="515203"/>
+            <a:off x="421641" y="695706"/>
+            <a:ext cx="3172234" cy="1083447"/>
           </a:xfrm>
           <a:prstGeom prst="roundRect">
             <a:avLst/>
           </a:prstGeom>
+          <a:solidFill>
+            <a:schemeClr val="accent4"/>
+          </a:solidFill>
           <a:ln w="12700">
             <a:noFill/>
+            <a:prstDash val="dash"/>
+          </a:ln>
+        </p:spPr>
+        <p:style>
+          <a:lnRef idx="2">
+            <a:schemeClr val="accent6"/>
+          </a:lnRef>
+          <a:fillRef idx="1">
+            <a:schemeClr val="lt1"/>
+          </a:fillRef>
+          <a:effectRef idx="0">
+            <a:schemeClr val="accent6"/>
+          </a:effectRef>
+          <a:fontRef idx="minor">
+            <a:schemeClr val="dk1"/>
+          </a:fontRef>
+        </p:style>
+        <p:txBody>
+          <a:bodyPr rtlCol="0" anchor="ctr"/>
+          <a:lstStyle/>
+          <a:p>
+            <a:pPr algn="ctr"/>
+            <a:r>
+              <a:rPr lang="fr-FR" sz="1400" dirty="0">
+                <a:solidFill>
+                  <a:schemeClr val="bg1"/>
+                </a:solidFill>
+                <a:latin typeface="Source Sans Pro" panose="020B0503030403020204" pitchFamily="34" charset="0"/>
+                <a:ea typeface="Source Sans Pro" panose="020B0503030403020204" pitchFamily="34" charset="0"/>
+              </a:rPr>
+              <a:t>New </a:t>
+            </a:r>
+            <a:r>
+              <a:rPr lang="fr-FR" sz="1400" dirty="0" err="1">
+                <a:solidFill>
+                  <a:schemeClr val="bg1"/>
+                </a:solidFill>
+                <a:latin typeface="Source Sans Pro" panose="020B0503030403020204" pitchFamily="34" charset="0"/>
+                <a:ea typeface="Source Sans Pro" panose="020B0503030403020204" pitchFamily="34" charset="0"/>
+              </a:rPr>
+              <a:t>Feature</a:t>
+            </a:r>
+            <a:endParaRPr lang="fr-FR" sz="1400" dirty="0">
+              <a:solidFill>
+                <a:schemeClr val="bg1"/>
+              </a:solidFill>
+              <a:latin typeface="Source Sans Pro" panose="020B0503030403020204" pitchFamily="34" charset="0"/>
+              <a:ea typeface="Source Sans Pro" panose="020B0503030403020204" pitchFamily="34" charset="0"/>
+            </a:endParaRPr>
+          </a:p>
+          <a:p>
+            <a:pPr algn="ctr"/>
+            <a:endParaRPr lang="fr-FR" sz="1400" dirty="0">
+              <a:solidFill>
+                <a:schemeClr val="bg1"/>
+              </a:solidFill>
+              <a:latin typeface="Source Sans Pro Light" panose="020B0403030403020204" pitchFamily="34" charset="0"/>
+              <a:ea typeface="Source Sans Pro Light" panose="020B0403030403020204" pitchFamily="34" charset="0"/>
+            </a:endParaRPr>
+          </a:p>
+          <a:p>
+            <a:pPr algn="ctr"/>
+            <a:endParaRPr lang="fr-FR" sz="1400" dirty="0">
+              <a:solidFill>
+                <a:schemeClr val="bg1"/>
+              </a:solidFill>
+              <a:latin typeface="Source Sans Pro Light" panose="020B0403030403020204" pitchFamily="34" charset="0"/>
+              <a:ea typeface="Source Sans Pro Light" panose="020B0403030403020204" pitchFamily="34" charset="0"/>
+            </a:endParaRPr>
+          </a:p>
+          <a:p>
+            <a:pPr algn="ctr"/>
+            <a:endParaRPr lang="en-US" sz="1400" dirty="0">
+              <a:solidFill>
+                <a:schemeClr val="bg1"/>
+              </a:solidFill>
+              <a:latin typeface="Source Sans Pro Light" panose="020B0403030403020204" pitchFamily="34" charset="0"/>
+              <a:ea typeface="Source Sans Pro Light" panose="020B0403030403020204" pitchFamily="34" charset="0"/>
+            </a:endParaRPr>
+          </a:p>
+        </p:txBody>
+      </p:sp>
+      <p:sp>
+        <p:nvSpPr>
+          <p:cNvPr id="13" name="Rectangle: Rounded Corners 12">
+            <a:extLst>
+              <a:ext uri="{FF2B5EF4-FFF2-40B4-BE49-F238E27FC236}">
+                <a16:creationId xmlns:a16="http://schemas.microsoft.com/office/drawing/2014/main" id="{19ECD98E-7A0D-31D8-DA7E-E271460C184C}"/>
+              </a:ext>
+            </a:extLst>
+          </p:cNvPr>
+          <p:cNvSpPr/>
+          <p:nvPr/>
+        </p:nvSpPr>
+        <p:spPr>
+          <a:xfrm>
+            <a:off x="567616" y="1114806"/>
+            <a:ext cx="2871625" cy="522734"/>
+          </a:xfrm>
+          <a:prstGeom prst="roundRect">
+            <a:avLst/>
+          </a:prstGeom>
+          <a:ln w="12700">
+            <a:solidFill>
+              <a:schemeClr val="accent4"/>
+            </a:solidFill>
           </a:ln>
         </p:spPr>
         <p:style>
@@ -8042,21 +8151,53 @@
           <a:p>
             <a:pPr algn="ctr"/>
             <a:r>
-              <a:rPr lang="en-US" sz="1400" dirty="0">
+              <a:rPr lang="fr-FR" sz="1400" dirty="0">
                 <a:latin typeface="Source Sans Pro Light" panose="020B0403030403020204" pitchFamily="34" charset="0"/>
                 <a:ea typeface="Source Sans Pro Light" panose="020B0403030403020204" pitchFamily="34" charset="0"/>
               </a:rPr>
-              <a:t>Installs the Feature</a:t>
-            </a:r>
+              <a:t>New </a:t>
+            </a:r>
+            <a:r>
+              <a:rPr lang="fr-FR" sz="1400" dirty="0" err="1">
+                <a:latin typeface="Source Sans Pro Light" panose="020B0403030403020204" pitchFamily="34" charset="0"/>
+                <a:ea typeface="Source Sans Pro Light" panose="020B0403030403020204" pitchFamily="34" charset="0"/>
+              </a:rPr>
+              <a:t>Feature</a:t>
+            </a:r>
+            <a:r>
+              <a:rPr lang="fr-FR" sz="1400" dirty="0">
+                <a:latin typeface="Source Sans Pro Light" panose="020B0403030403020204" pitchFamily="34" charset="0"/>
+                <a:ea typeface="Source Sans Pro Light" panose="020B0403030403020204" pitchFamily="34" charset="0"/>
+              </a:rPr>
+              <a:t> </a:t>
+            </a:r>
+            <a:r>
+              <a:rPr lang="fr-FR" sz="1400" dirty="0" err="1">
+                <a:latin typeface="Source Sans Pro Light" panose="020B0403030403020204" pitchFamily="34" charset="0"/>
+                <a:ea typeface="Source Sans Pro Light" panose="020B0403030403020204" pitchFamily="34" charset="0"/>
+              </a:rPr>
+              <a:t>deployed</a:t>
+            </a:r>
+            <a:r>
+              <a:rPr lang="fr-FR" sz="1400" dirty="0">
+                <a:latin typeface="Source Sans Pro Light" panose="020B0403030403020204" pitchFamily="34" charset="0"/>
+                <a:ea typeface="Source Sans Pro Light" panose="020B0403030403020204" pitchFamily="34" charset="0"/>
+              </a:rPr>
+              <a:t> onto the Kernel</a:t>
+            </a:r>
+            <a:endParaRPr lang="en-US" sz="1400" dirty="0">
+              <a:latin typeface="Source Sans Pro Light" panose="020B0403030403020204" pitchFamily="34" charset="0"/>
+              <a:ea typeface="Source Sans Pro Light" panose="020B0403030403020204" pitchFamily="34" charset="0"/>
+            </a:endParaRPr>
           </a:p>
         </p:txBody>
       </p:sp>
       <p:sp>
         <p:nvSpPr>
-          <p:cNvPr id="9" name="Rectangle: Rounded Corners 8">
+          <p:cNvPr id="14" name="Rectangle: Rounded Corners 13">
             <a:extLst>
               <a:ext uri="{FF2B5EF4-FFF2-40B4-BE49-F238E27FC236}">
-                <a16:creationId xmlns:a16="http://schemas.microsoft.com/office/drawing/2014/main" id="{25E0B8A4-1023-01E8-A665-DA9EE37B08FA}"/>
+                <a16:creationId xmlns:a16="http://schemas.microsoft.com/office/drawing/2014/main" id="{A675B611-431D-A99A-C141-9852C1E59B27}"/>
               </a:ext>
             </a:extLst>
           </p:cNvPr>
@@ -8065,8 +8206,8 @@
         </p:nvSpPr>
         <p:spPr>
           <a:xfrm>
-            <a:off x="567616" y="2784473"/>
-            <a:ext cx="2872363" cy="498253"/>
+            <a:off x="3890238" y="1113722"/>
+            <a:ext cx="2871815" cy="547393"/>
           </a:xfrm>
           <a:prstGeom prst="roundRect">
             <a:avLst/>
@@ -8095,389 +8236,11 @@
           <a:p>
             <a:pPr algn="ctr"/>
             <a:r>
-              <a:rPr lang="en-US" sz="1400" dirty="0">
-                <a:latin typeface="Source Sans Pro Light" panose="020B0403030403020204" pitchFamily="34" charset="0"/>
-                <a:ea typeface="Source Sans Pro Light" panose="020B0403030403020204" pitchFamily="34" charset="0"/>
-              </a:rPr>
-              <a:t>Reads permission file from the Feature resources</a:t>
-            </a:r>
-          </a:p>
-        </p:txBody>
-      </p:sp>
-      <p:sp>
-        <p:nvSpPr>
-          <p:cNvPr id="10" name="Rectangle: Rounded Corners 9">
-            <a:extLst>
-              <a:ext uri="{FF2B5EF4-FFF2-40B4-BE49-F238E27FC236}">
-                <a16:creationId xmlns:a16="http://schemas.microsoft.com/office/drawing/2014/main" id="{E1985890-C9C8-D0BD-BEB7-E15957B6177E}"/>
-              </a:ext>
-            </a:extLst>
-          </p:cNvPr>
-          <p:cNvSpPr/>
-          <p:nvPr/>
-        </p:nvSpPr>
-        <p:spPr>
-          <a:xfrm>
-            <a:off x="568166" y="3641923"/>
-            <a:ext cx="2871813" cy="730423"/>
-          </a:xfrm>
-          <a:prstGeom prst="roundRect">
-            <a:avLst/>
-          </a:prstGeom>
-          <a:ln w="12700">
-            <a:solidFill>
-              <a:schemeClr val="tx2"/>
-            </a:solidFill>
-          </a:ln>
-        </p:spPr>
-        <p:style>
-          <a:lnRef idx="2">
-            <a:schemeClr val="accent3"/>
-          </a:lnRef>
-          <a:fillRef idx="1">
-            <a:schemeClr val="lt1"/>
-          </a:fillRef>
-          <a:effectRef idx="0">
-            <a:schemeClr val="accent3"/>
-          </a:effectRef>
-          <a:fontRef idx="minor">
-            <a:schemeClr val="dk1"/>
-          </a:fontRef>
-        </p:style>
-        <p:txBody>
-          <a:bodyPr rtlCol="0" anchor="ctr"/>
-          <a:lstStyle/>
-          <a:p>
-            <a:pPr algn="ctr"/>
-            <a:r>
-              <a:rPr lang="en-US" sz="1400" dirty="0">
-                <a:latin typeface="Source Sans Pro Light" panose="020B0403030403020204" pitchFamily="34" charset="0"/>
-                <a:ea typeface="Source Sans Pro Light" panose="020B0403030403020204" pitchFamily="34" charset="0"/>
-              </a:rPr>
-              <a:t>Parses permissions and add them </a:t>
-            </a:r>
-          </a:p>
-          <a:p>
-            <a:pPr algn="ctr"/>
-            <a:r>
-              <a:rPr lang="en-US" sz="1400" dirty="0">
-                <a:latin typeface="Source Sans Pro Light" panose="020B0403030403020204" pitchFamily="34" charset="0"/>
-                <a:ea typeface="Source Sans Pro Light" panose="020B0403030403020204" pitchFamily="34" charset="0"/>
-              </a:rPr>
-              <a:t>to the authorized map</a:t>
-            </a:r>
-          </a:p>
-        </p:txBody>
-      </p:sp>
-      <p:sp>
-        <p:nvSpPr>
-          <p:cNvPr id="12" name="Rectangle: Rounded Corners 11">
-            <a:extLst>
-              <a:ext uri="{FF2B5EF4-FFF2-40B4-BE49-F238E27FC236}">
-                <a16:creationId xmlns:a16="http://schemas.microsoft.com/office/drawing/2014/main" id="{1C785E8C-F7EC-A41C-98FC-ED11BF22C78E}"/>
-              </a:ext>
-            </a:extLst>
-          </p:cNvPr>
-          <p:cNvSpPr/>
-          <p:nvPr/>
-        </p:nvSpPr>
-        <p:spPr>
-          <a:xfrm>
-            <a:off x="421641" y="695706"/>
-            <a:ext cx="3172234" cy="1083447"/>
-          </a:xfrm>
-          <a:prstGeom prst="roundRect">
-            <a:avLst/>
-          </a:prstGeom>
-          <a:solidFill>
-            <a:schemeClr val="accent4"/>
-          </a:solidFill>
-          <a:ln w="12700">
-            <a:noFill/>
-            <a:prstDash val="dash"/>
-          </a:ln>
-        </p:spPr>
-        <p:style>
-          <a:lnRef idx="2">
-            <a:schemeClr val="accent6"/>
-          </a:lnRef>
-          <a:fillRef idx="1">
-            <a:schemeClr val="lt1"/>
-          </a:fillRef>
-          <a:effectRef idx="0">
-            <a:schemeClr val="accent6"/>
-          </a:effectRef>
-          <a:fontRef idx="minor">
-            <a:schemeClr val="dk1"/>
-          </a:fontRef>
-        </p:style>
-        <p:txBody>
-          <a:bodyPr rtlCol="0" anchor="ctr"/>
-          <a:lstStyle/>
-          <a:p>
-            <a:pPr algn="ctr"/>
-            <a:r>
-              <a:rPr lang="fr-FR" sz="1400" dirty="0">
-                <a:solidFill>
-                  <a:schemeClr val="bg1"/>
-                </a:solidFill>
-                <a:latin typeface="Source Sans Pro" panose="020B0503030403020204" pitchFamily="34" charset="0"/>
-                <a:ea typeface="Source Sans Pro" panose="020B0503030403020204" pitchFamily="34" charset="0"/>
-              </a:rPr>
-              <a:t>New </a:t>
-            </a:r>
-            <a:r>
-              <a:rPr lang="fr-FR" sz="1400" dirty="0" err="1">
-                <a:solidFill>
-                  <a:schemeClr val="bg1"/>
-                </a:solidFill>
-                <a:latin typeface="Source Sans Pro" panose="020B0503030403020204" pitchFamily="34" charset="0"/>
-                <a:ea typeface="Source Sans Pro" panose="020B0503030403020204" pitchFamily="34" charset="0"/>
-              </a:rPr>
-              <a:t>Feature</a:t>
-            </a:r>
-            <a:endParaRPr lang="fr-FR" sz="1400" dirty="0">
-              <a:solidFill>
-                <a:schemeClr val="bg1"/>
-              </a:solidFill>
-              <a:latin typeface="Source Sans Pro" panose="020B0503030403020204" pitchFamily="34" charset="0"/>
-              <a:ea typeface="Source Sans Pro" panose="020B0503030403020204" pitchFamily="34" charset="0"/>
-            </a:endParaRPr>
-          </a:p>
-          <a:p>
-            <a:pPr algn="ctr"/>
-            <a:endParaRPr lang="fr-FR" sz="1400" dirty="0">
-              <a:solidFill>
-                <a:schemeClr val="bg1"/>
-              </a:solidFill>
-              <a:latin typeface="Source Sans Pro Light" panose="020B0403030403020204" pitchFamily="34" charset="0"/>
-              <a:ea typeface="Source Sans Pro Light" panose="020B0403030403020204" pitchFamily="34" charset="0"/>
-            </a:endParaRPr>
-          </a:p>
-          <a:p>
-            <a:pPr algn="ctr"/>
-            <a:endParaRPr lang="fr-FR" sz="1400" dirty="0">
-              <a:solidFill>
-                <a:schemeClr val="bg1"/>
-              </a:solidFill>
-              <a:latin typeface="Source Sans Pro Light" panose="020B0403030403020204" pitchFamily="34" charset="0"/>
-              <a:ea typeface="Source Sans Pro Light" panose="020B0403030403020204" pitchFamily="34" charset="0"/>
-            </a:endParaRPr>
-          </a:p>
-          <a:p>
-            <a:pPr algn="ctr"/>
-            <a:endParaRPr lang="en-US" sz="1400" dirty="0">
-              <a:solidFill>
-                <a:schemeClr val="bg1"/>
-              </a:solidFill>
-              <a:latin typeface="Source Sans Pro Light" panose="020B0403030403020204" pitchFamily="34" charset="0"/>
-              <a:ea typeface="Source Sans Pro Light" panose="020B0403030403020204" pitchFamily="34" charset="0"/>
-            </a:endParaRPr>
-          </a:p>
-        </p:txBody>
-      </p:sp>
-      <p:sp>
-        <p:nvSpPr>
-          <p:cNvPr id="13" name="Rectangle: Rounded Corners 12">
-            <a:extLst>
-              <a:ext uri="{FF2B5EF4-FFF2-40B4-BE49-F238E27FC236}">
-                <a16:creationId xmlns:a16="http://schemas.microsoft.com/office/drawing/2014/main" id="{19ECD98E-7A0D-31D8-DA7E-E271460C184C}"/>
-              </a:ext>
-            </a:extLst>
-          </p:cNvPr>
-          <p:cNvSpPr/>
-          <p:nvPr/>
-        </p:nvSpPr>
-        <p:spPr>
-          <a:xfrm>
-            <a:off x="567616" y="1114806"/>
-            <a:ext cx="2871625" cy="522734"/>
-          </a:xfrm>
-          <a:prstGeom prst="roundRect">
-            <a:avLst/>
-          </a:prstGeom>
-          <a:ln w="12700">
-            <a:solidFill>
-              <a:schemeClr val="accent4"/>
-            </a:solidFill>
-          </a:ln>
-        </p:spPr>
-        <p:style>
-          <a:lnRef idx="2">
-            <a:schemeClr val="accent3"/>
-          </a:lnRef>
-          <a:fillRef idx="1">
-            <a:schemeClr val="lt1"/>
-          </a:fillRef>
-          <a:effectRef idx="0">
-            <a:schemeClr val="accent3"/>
-          </a:effectRef>
-          <a:fontRef idx="minor">
-            <a:schemeClr val="dk1"/>
-          </a:fontRef>
-        </p:style>
-        <p:txBody>
-          <a:bodyPr rtlCol="0" anchor="ctr"/>
-          <a:lstStyle/>
-          <a:p>
-            <a:pPr algn="ctr"/>
-            <a:r>
-              <a:rPr lang="fr-FR" sz="1400" dirty="0">
-                <a:latin typeface="Source Sans Pro Light" panose="020B0403030403020204" pitchFamily="34" charset="0"/>
-                <a:ea typeface="Source Sans Pro Light" panose="020B0403030403020204" pitchFamily="34" charset="0"/>
-              </a:rPr>
-              <a:t>New </a:t>
-            </a:r>
-            <a:r>
-              <a:rPr lang="fr-FR" sz="1400" dirty="0" err="1">
-                <a:latin typeface="Source Sans Pro Light" panose="020B0403030403020204" pitchFamily="34" charset="0"/>
-                <a:ea typeface="Source Sans Pro Light" panose="020B0403030403020204" pitchFamily="34" charset="0"/>
-              </a:rPr>
-              <a:t>Feature</a:t>
-            </a:r>
-            <a:r>
-              <a:rPr lang="fr-FR" sz="1400" dirty="0">
-                <a:latin typeface="Source Sans Pro Light" panose="020B0403030403020204" pitchFamily="34" charset="0"/>
-                <a:ea typeface="Source Sans Pro Light" panose="020B0403030403020204" pitchFamily="34" charset="0"/>
-              </a:rPr>
-              <a:t> </a:t>
-            </a:r>
-            <a:r>
-              <a:rPr lang="fr-FR" sz="1400" dirty="0" err="1">
-                <a:latin typeface="Source Sans Pro Light" panose="020B0403030403020204" pitchFamily="34" charset="0"/>
-                <a:ea typeface="Source Sans Pro Light" panose="020B0403030403020204" pitchFamily="34" charset="0"/>
-              </a:rPr>
-              <a:t>deployed</a:t>
-            </a:r>
-            <a:r>
-              <a:rPr lang="fr-FR" sz="1400" dirty="0">
-                <a:latin typeface="Source Sans Pro Light" panose="020B0403030403020204" pitchFamily="34" charset="0"/>
-                <a:ea typeface="Source Sans Pro Light" panose="020B0403030403020204" pitchFamily="34" charset="0"/>
-              </a:rPr>
-              <a:t> onto the Kernel</a:t>
-            </a:r>
-            <a:endParaRPr lang="en-US" sz="1400" dirty="0">
-              <a:latin typeface="Source Sans Pro Light" panose="020B0403030403020204" pitchFamily="34" charset="0"/>
-              <a:ea typeface="Source Sans Pro Light" panose="020B0403030403020204" pitchFamily="34" charset="0"/>
-            </a:endParaRPr>
-          </a:p>
-        </p:txBody>
-      </p:sp>
-      <p:sp>
-        <p:nvSpPr>
-          <p:cNvPr id="14" name="Rectangle: Rounded Corners 13">
-            <a:extLst>
-              <a:ext uri="{FF2B5EF4-FFF2-40B4-BE49-F238E27FC236}">
-                <a16:creationId xmlns:a16="http://schemas.microsoft.com/office/drawing/2014/main" id="{A675B611-431D-A99A-C141-9852C1E59B27}"/>
-              </a:ext>
-            </a:extLst>
-          </p:cNvPr>
-          <p:cNvSpPr/>
-          <p:nvPr/>
-        </p:nvSpPr>
-        <p:spPr>
-          <a:xfrm>
-            <a:off x="3890238" y="1113722"/>
-            <a:ext cx="2871815" cy="547393"/>
-          </a:xfrm>
-          <a:prstGeom prst="roundRect">
-            <a:avLst/>
-          </a:prstGeom>
-          <a:ln w="12700">
-            <a:noFill/>
-          </a:ln>
-        </p:spPr>
-        <p:style>
-          <a:lnRef idx="2">
-            <a:schemeClr val="accent3"/>
-          </a:lnRef>
-          <a:fillRef idx="1">
-            <a:schemeClr val="lt1"/>
-          </a:fillRef>
-          <a:effectRef idx="0">
-            <a:schemeClr val="accent3"/>
-          </a:effectRef>
-          <a:fontRef idx="minor">
-            <a:schemeClr val="dk1"/>
-          </a:fontRef>
-        </p:style>
-        <p:txBody>
-          <a:bodyPr rtlCol="0" anchor="ctr"/>
-          <a:lstStyle/>
-          <a:p>
-            <a:pPr algn="ctr"/>
-            <a:r>
               <a:rPr lang="fr-FR" sz="1400" dirty="0">
                 <a:latin typeface="Source Sans Pro Light" panose="020B0403030403020204" pitchFamily="34" charset="0"/>
                 <a:ea typeface="Source Sans Pro Light" panose="020B0403030403020204" pitchFamily="34" charset="0"/>
               </a:rPr>
               <a:t>Check for permission</a:t>
-            </a:r>
-            <a:endParaRPr lang="en-US" sz="1400" dirty="0">
-              <a:latin typeface="Source Sans Pro Light" panose="020B0403030403020204" pitchFamily="34" charset="0"/>
-              <a:ea typeface="Source Sans Pro Light" panose="020B0403030403020204" pitchFamily="34" charset="0"/>
-            </a:endParaRPr>
-          </a:p>
-        </p:txBody>
-      </p:sp>
-      <p:sp>
-        <p:nvSpPr>
-          <p:cNvPr id="15" name="Rectangle: Rounded Corners 14">
-            <a:extLst>
-              <a:ext uri="{FF2B5EF4-FFF2-40B4-BE49-F238E27FC236}">
-                <a16:creationId xmlns:a16="http://schemas.microsoft.com/office/drawing/2014/main" id="{360CA92F-4FA0-9583-4A4C-35A9053B7FD7}"/>
-              </a:ext>
-            </a:extLst>
-          </p:cNvPr>
-          <p:cNvSpPr/>
-          <p:nvPr/>
-        </p:nvSpPr>
-        <p:spPr>
-          <a:xfrm>
-            <a:off x="3892813" y="3646275"/>
-            <a:ext cx="2871815" cy="730423"/>
-          </a:xfrm>
-          <a:prstGeom prst="roundRect">
-            <a:avLst/>
-          </a:prstGeom>
-          <a:ln w="12700">
-            <a:solidFill>
-              <a:schemeClr val="tx2"/>
-            </a:solidFill>
-          </a:ln>
-        </p:spPr>
-        <p:style>
-          <a:lnRef idx="2">
-            <a:schemeClr val="accent3"/>
-          </a:lnRef>
-          <a:fillRef idx="1">
-            <a:schemeClr val="lt1"/>
-          </a:fillRef>
-          <a:effectRef idx="0">
-            <a:schemeClr val="accent3"/>
-          </a:effectRef>
-          <a:fontRef idx="minor">
-            <a:schemeClr val="dk1"/>
-          </a:fontRef>
-        </p:style>
-        <p:txBody>
-          <a:bodyPr rtlCol="0" anchor="ctr"/>
-          <a:lstStyle/>
-          <a:p>
-            <a:pPr algn="ctr"/>
-            <a:r>
-              <a:rPr lang="en-US" sz="1400" dirty="0">
-                <a:latin typeface="Source Sans Pro Light" panose="020B0403030403020204" pitchFamily="34" charset="0"/>
-                <a:ea typeface="Source Sans Pro Light" panose="020B0403030403020204" pitchFamily="34" charset="0"/>
-              </a:rPr>
-              <a:t>Checks if permission is in the authorized map. If not, throws a </a:t>
-            </a:r>
-            <a:r>
-              <a:rPr lang="en-US" sz="1400" dirty="0" err="1">
-                <a:latin typeface="Source Sans Pro Light" panose="020B0403030403020204" pitchFamily="34" charset="0"/>
-                <a:ea typeface="Source Sans Pro Light" panose="020B0403030403020204" pitchFamily="34" charset="0"/>
-              </a:rPr>
-              <a:t>SecurityException</a:t>
             </a:r>
             <a:endParaRPr lang="en-US" sz="1400" dirty="0">
               <a:latin typeface="Source Sans Pro Light" panose="020B0403030403020204" pitchFamily="34" charset="0"/>
@@ -8498,14 +8261,14 @@
           <p:cNvCxnSpPr>
             <a:cxnSpLocks/>
             <a:stCxn id="12" idx="2"/>
-            <a:endCxn id="7" idx="0"/>
+            <a:endCxn id="48" idx="0"/>
           </p:cNvCxnSpPr>
           <p:nvPr/>
         </p:nvCxnSpPr>
         <p:spPr>
           <a:xfrm flipH="1">
-            <a:off x="2006123" y="1779153"/>
-            <a:ext cx="1635" cy="344424"/>
+            <a:off x="2001470" y="1779153"/>
+            <a:ext cx="6288" cy="484867"/>
           </a:xfrm>
           <a:prstGeom prst="straightConnector1">
             <a:avLst/>
@@ -8545,14 +8308,14 @@
           <p:cNvCxnSpPr>
             <a:cxnSpLocks/>
             <a:stCxn id="14" idx="2"/>
-            <a:endCxn id="15" idx="0"/>
+            <a:endCxn id="78" idx="0"/>
           </p:cNvCxnSpPr>
           <p:nvPr/>
         </p:nvCxnSpPr>
         <p:spPr>
           <a:xfrm>
             <a:off x="5326146" y="1661115"/>
-            <a:ext cx="2575" cy="1985160"/>
+            <a:ext cx="2051" cy="2068237"/>
           </a:xfrm>
           <a:prstGeom prst="straightConnector1">
             <a:avLst/>
@@ -8593,15 +8356,15 @@
           </p:cNvPr>
           <p:cNvCxnSpPr>
             <a:cxnSpLocks/>
-            <a:stCxn id="9" idx="2"/>
-            <a:endCxn id="10" idx="0"/>
+            <a:stCxn id="57" idx="2"/>
+            <a:endCxn id="59" idx="0"/>
           </p:cNvCxnSpPr>
           <p:nvPr/>
         </p:nvCxnSpPr>
         <p:spPr>
           <a:xfrm>
-            <a:off x="2003798" y="3282726"/>
-            <a:ext cx="275" cy="359197"/>
+            <a:off x="2001470" y="3255325"/>
+            <a:ext cx="0" cy="474028"/>
           </a:xfrm>
           <a:prstGeom prst="straightConnector1">
             <a:avLst/>
@@ -8642,15 +8405,15 @@
           </p:cNvPr>
           <p:cNvCxnSpPr>
             <a:cxnSpLocks/>
-            <a:stCxn id="7" idx="2"/>
-            <a:endCxn id="9" idx="0"/>
+            <a:stCxn id="48" idx="2"/>
+            <a:endCxn id="57" idx="0"/>
           </p:cNvCxnSpPr>
           <p:nvPr/>
         </p:nvCxnSpPr>
         <p:spPr>
-          <a:xfrm flipH="1">
-            <a:off x="2003798" y="2638780"/>
-            <a:ext cx="2325" cy="145693"/>
+          <a:xfrm>
+            <a:off x="2001470" y="2479464"/>
+            <a:ext cx="0" cy="344974"/>
           </a:xfrm>
           <a:prstGeom prst="straightConnector1">
             <a:avLst/>
@@ -8691,14 +8454,14 @@
           </p:cNvPr>
           <p:cNvCxnSpPr>
             <a:cxnSpLocks/>
-            <a:stCxn id="10" idx="2"/>
+            <a:stCxn id="59" idx="2"/>
           </p:cNvCxnSpPr>
           <p:nvPr/>
         </p:nvCxnSpPr>
         <p:spPr>
-          <a:xfrm flipH="1">
-            <a:off x="2003798" y="4372346"/>
-            <a:ext cx="275" cy="206969"/>
+          <a:xfrm>
+            <a:off x="2001470" y="4160240"/>
+            <a:ext cx="2329" cy="419075"/>
           </a:xfrm>
           <a:prstGeom prst="straightConnector1">
             <a:avLst/>
@@ -8739,14 +8502,14 @@
           </p:cNvPr>
           <p:cNvCxnSpPr>
             <a:cxnSpLocks/>
-            <a:stCxn id="15" idx="2"/>
+            <a:stCxn id="78" idx="2"/>
           </p:cNvCxnSpPr>
           <p:nvPr/>
         </p:nvCxnSpPr>
         <p:spPr>
           <a:xfrm>
-            <a:off x="5328721" y="4376698"/>
-            <a:ext cx="0" cy="202617"/>
+            <a:off x="5328197" y="4160239"/>
+            <a:ext cx="524" cy="419076"/>
           </a:xfrm>
           <a:prstGeom prst="straightConnector1">
             <a:avLst/>
@@ -8776,114 +8539,6 @@
           </a:fontRef>
         </p:style>
       </p:cxnSp>
-      <p:sp>
-        <p:nvSpPr>
-          <p:cNvPr id="36" name="Rectangle: Rounded Corners 35">
-            <a:extLst>
-              <a:ext uri="{FF2B5EF4-FFF2-40B4-BE49-F238E27FC236}">
-                <a16:creationId xmlns:a16="http://schemas.microsoft.com/office/drawing/2014/main" id="{872C8C25-4D8C-476F-A2A4-1FCF4FA4D61B}"/>
-              </a:ext>
-            </a:extLst>
-          </p:cNvPr>
-          <p:cNvSpPr/>
-          <p:nvPr/>
-        </p:nvSpPr>
-        <p:spPr>
-          <a:xfrm>
-            <a:off x="7197142" y="2123577"/>
-            <a:ext cx="2874833" cy="515203"/>
-          </a:xfrm>
-          <a:prstGeom prst="roundRect">
-            <a:avLst/>
-          </a:prstGeom>
-          <a:ln w="12700">
-            <a:noFill/>
-          </a:ln>
-        </p:spPr>
-        <p:style>
-          <a:lnRef idx="2">
-            <a:schemeClr val="accent3"/>
-          </a:lnRef>
-          <a:fillRef idx="1">
-            <a:schemeClr val="lt1"/>
-          </a:fillRef>
-          <a:effectRef idx="0">
-            <a:schemeClr val="accent3"/>
-          </a:effectRef>
-          <a:fontRef idx="minor">
-            <a:schemeClr val="dk1"/>
-          </a:fontRef>
-        </p:style>
-        <p:txBody>
-          <a:bodyPr rtlCol="0" anchor="ctr"/>
-          <a:lstStyle/>
-          <a:p>
-            <a:pPr algn="ctr"/>
-            <a:r>
-              <a:rPr lang="en-US" sz="1400" dirty="0">
-                <a:latin typeface="Source Sans Pro Light" panose="020B0403030403020204" pitchFamily="34" charset="0"/>
-                <a:ea typeface="Source Sans Pro Light" panose="020B0403030403020204" pitchFamily="34" charset="0"/>
-              </a:rPr>
-              <a:t>Uninstalls the Feature</a:t>
-            </a:r>
-          </a:p>
-        </p:txBody>
-      </p:sp>
-      <p:sp>
-        <p:nvSpPr>
-          <p:cNvPr id="38" name="Rectangle: Rounded Corners 37">
-            <a:extLst>
-              <a:ext uri="{FF2B5EF4-FFF2-40B4-BE49-F238E27FC236}">
-                <a16:creationId xmlns:a16="http://schemas.microsoft.com/office/drawing/2014/main" id="{C118E130-D44F-4B92-A441-ACE77C3FB6C1}"/>
-              </a:ext>
-            </a:extLst>
-          </p:cNvPr>
-          <p:cNvSpPr/>
-          <p:nvPr/>
-        </p:nvSpPr>
-        <p:spPr>
-          <a:xfrm>
-            <a:off x="7188710" y="3659052"/>
-            <a:ext cx="2883261" cy="730423"/>
-          </a:xfrm>
-          <a:prstGeom prst="roundRect">
-            <a:avLst/>
-          </a:prstGeom>
-          <a:ln w="12700">
-            <a:solidFill>
-              <a:schemeClr val="tx2"/>
-            </a:solidFill>
-          </a:ln>
-        </p:spPr>
-        <p:style>
-          <a:lnRef idx="2">
-            <a:schemeClr val="accent3"/>
-          </a:lnRef>
-          <a:fillRef idx="1">
-            <a:schemeClr val="lt1"/>
-          </a:fillRef>
-          <a:effectRef idx="0">
-            <a:schemeClr val="accent3"/>
-          </a:effectRef>
-          <a:fontRef idx="minor">
-            <a:schemeClr val="dk1"/>
-          </a:fontRef>
-        </p:style>
-        <p:txBody>
-          <a:bodyPr rtlCol="0" anchor="ctr"/>
-          <a:lstStyle/>
-          <a:p>
-            <a:pPr algn="ctr"/>
-            <a:r>
-              <a:rPr lang="en-US" sz="1400" dirty="0">
-                <a:latin typeface="Source Sans Pro Light" panose="020B0403030403020204" pitchFamily="34" charset="0"/>
-                <a:ea typeface="Source Sans Pro Light" panose="020B0403030403020204" pitchFamily="34" charset="0"/>
-              </a:rPr>
-              <a:t>Removes cached permissions from the map if it exists</a:t>
-            </a:r>
-          </a:p>
-        </p:txBody>
-      </p:sp>
       <p:sp>
         <p:nvSpPr>
           <p:cNvPr id="39" name="Rectangle: Rounded Corners 38">
@@ -8995,15 +8650,15 @@
           </p:cNvPr>
           <p:cNvCxnSpPr>
             <a:cxnSpLocks/>
-            <a:stCxn id="3" idx="0"/>
-            <a:endCxn id="36" idx="2"/>
+            <a:stCxn id="70" idx="0"/>
+            <a:endCxn id="62" idx="2"/>
           </p:cNvCxnSpPr>
           <p:nvPr/>
         </p:nvCxnSpPr>
         <p:spPr>
           <a:xfrm flipV="1">
-            <a:off x="8634556" y="2638780"/>
-            <a:ext cx="3" cy="159530"/>
+            <a:off x="8634231" y="2479464"/>
+            <a:ext cx="3867" cy="394712"/>
           </a:xfrm>
           <a:prstGeom prst="straightConnector1">
             <a:avLst/>
@@ -9042,14 +8697,14 @@
           </p:cNvPr>
           <p:cNvCxnSpPr>
             <a:cxnSpLocks/>
-            <a:stCxn id="38" idx="2"/>
+            <a:stCxn id="74" idx="2"/>
           </p:cNvCxnSpPr>
           <p:nvPr/>
         </p:nvCxnSpPr>
         <p:spPr>
-          <a:xfrm flipH="1">
-            <a:off x="8630340" y="4389475"/>
-            <a:ext cx="1" cy="189840"/>
+          <a:xfrm>
+            <a:off x="8634231" y="4219928"/>
+            <a:ext cx="0" cy="388896"/>
           </a:xfrm>
           <a:prstGeom prst="straightConnector1">
             <a:avLst/>
@@ -9090,15 +8745,15 @@
           </p:cNvPr>
           <p:cNvCxnSpPr>
             <a:cxnSpLocks/>
-            <a:stCxn id="3" idx="2"/>
-            <a:endCxn id="38" idx="0"/>
+            <a:stCxn id="70" idx="2"/>
+            <a:endCxn id="74" idx="0"/>
           </p:cNvCxnSpPr>
           <p:nvPr/>
         </p:nvCxnSpPr>
         <p:spPr>
-          <a:xfrm flipH="1">
-            <a:off x="8630341" y="3282726"/>
-            <a:ext cx="4215" cy="376326"/>
+          <a:xfrm>
+            <a:off x="8634231" y="3089620"/>
+            <a:ext cx="0" cy="699421"/>
           </a:xfrm>
           <a:prstGeom prst="straightConnector1">
             <a:avLst/>
@@ -9128,98 +8783,6 @@
           </a:fontRef>
         </p:style>
       </p:cxnSp>
-      <p:sp>
-        <p:nvSpPr>
-          <p:cNvPr id="3" name="Rectangle: Rounded Corners 2">
-            <a:extLst>
-              <a:ext uri="{FF2B5EF4-FFF2-40B4-BE49-F238E27FC236}">
-                <a16:creationId xmlns:a16="http://schemas.microsoft.com/office/drawing/2014/main" id="{586E2B17-4EBE-8D7C-0142-89D5D5F40ECC}"/>
-              </a:ext>
-            </a:extLst>
-          </p:cNvPr>
-          <p:cNvSpPr/>
-          <p:nvPr/>
-        </p:nvSpPr>
-        <p:spPr>
-          <a:xfrm>
-            <a:off x="7197139" y="2798310"/>
-            <a:ext cx="2874833" cy="484416"/>
-          </a:xfrm>
-          <a:prstGeom prst="roundRect">
-            <a:avLst/>
-          </a:prstGeom>
-          <a:ln w="12700">
-            <a:noFill/>
-          </a:ln>
-        </p:spPr>
-        <p:style>
-          <a:lnRef idx="2">
-            <a:schemeClr val="accent3"/>
-          </a:lnRef>
-          <a:fillRef idx="1">
-            <a:schemeClr val="lt1"/>
-          </a:fillRef>
-          <a:effectRef idx="0">
-            <a:schemeClr val="accent3"/>
-          </a:effectRef>
-          <a:fontRef idx="minor">
-            <a:schemeClr val="dk1"/>
-          </a:fontRef>
-        </p:style>
-        <p:txBody>
-          <a:bodyPr rtlCol="0" anchor="ctr"/>
-          <a:lstStyle/>
-          <a:p>
-            <a:pPr algn="ctr"/>
-            <a:r>
-              <a:rPr lang="fr-FR" sz="1400" dirty="0" err="1">
-                <a:latin typeface="Source Sans Pro Light" panose="020B0403030403020204" pitchFamily="34" charset="0"/>
-                <a:ea typeface="Source Sans Pro Light" panose="020B0403030403020204" pitchFamily="34" charset="0"/>
-              </a:rPr>
-              <a:t>Feature.uninstall</a:t>
-            </a:r>
-            <a:r>
-              <a:rPr lang="fr-FR" sz="1400" dirty="0">
-                <a:latin typeface="Source Sans Pro Light" panose="020B0403030403020204" pitchFamily="34" charset="0"/>
-                <a:ea typeface="Source Sans Pro Light" panose="020B0403030403020204" pitchFamily="34" charset="0"/>
-              </a:rPr>
-              <a:t>() </a:t>
-            </a:r>
-            <a:r>
-              <a:rPr lang="fr-FR" sz="1400" dirty="0" err="1">
-                <a:latin typeface="Source Sans Pro Light" panose="020B0403030403020204" pitchFamily="34" charset="0"/>
-                <a:ea typeface="Source Sans Pro Light" panose="020B0403030403020204" pitchFamily="34" charset="0"/>
-              </a:rPr>
-              <a:t>is</a:t>
-            </a:r>
-            <a:r>
-              <a:rPr lang="fr-FR" sz="1400" dirty="0">
-                <a:latin typeface="Source Sans Pro Light" panose="020B0403030403020204" pitchFamily="34" charset="0"/>
-                <a:ea typeface="Source Sans Pro Light" panose="020B0403030403020204" pitchFamily="34" charset="0"/>
-              </a:rPr>
-              <a:t> </a:t>
-            </a:r>
-            <a:r>
-              <a:rPr lang="fr-FR" sz="1400" dirty="0" err="1">
-                <a:latin typeface="Source Sans Pro Light" panose="020B0403030403020204" pitchFamily="34" charset="0"/>
-                <a:ea typeface="Source Sans Pro Light" panose="020B0403030403020204" pitchFamily="34" charset="0"/>
-              </a:rPr>
-              <a:t>called</a:t>
-            </a:r>
-            <a:r>
-              <a:rPr lang="fr-FR" sz="1400" dirty="0">
-                <a:latin typeface="Source Sans Pro Light" panose="020B0403030403020204" pitchFamily="34" charset="0"/>
-                <a:ea typeface="Source Sans Pro Light" panose="020B0403030403020204" pitchFamily="34" charset="0"/>
-              </a:rPr>
-              <a:t> </a:t>
-            </a:r>
-            <a:endParaRPr lang="en-US" sz="1400" dirty="0">
-              <a:latin typeface="Source Sans Pro Light" panose="020B0403030403020204" pitchFamily="34" charset="0"/>
-              <a:ea typeface="Source Sans Pro Light" panose="020B0403030403020204" pitchFamily="34" charset="0"/>
-            </a:endParaRPr>
-          </a:p>
-        </p:txBody>
-      </p:sp>
       <p:cxnSp>
         <p:nvCxnSpPr>
           <p:cNvPr id="22" name="Straight Arrow Connector 21">
@@ -9231,15 +8794,15 @@
           </p:cNvPr>
           <p:cNvCxnSpPr>
             <a:cxnSpLocks/>
-            <a:stCxn id="36" idx="0"/>
+            <a:stCxn id="62" idx="0"/>
             <a:endCxn id="39" idx="2"/>
           </p:cNvCxnSpPr>
           <p:nvPr/>
         </p:nvCxnSpPr>
         <p:spPr>
           <a:xfrm flipV="1">
-            <a:off x="8634559" y="1779153"/>
-            <a:ext cx="5148" cy="344424"/>
+            <a:off x="8638098" y="1779153"/>
+            <a:ext cx="1609" cy="484867"/>
           </a:xfrm>
           <a:prstGeom prst="straightConnector1">
             <a:avLst/>
@@ -9485,6 +9048,452 @@
               </a:rPr>
               <a:t>Kernel Security Policy Manager</a:t>
             </a:r>
+          </a:p>
+        </p:txBody>
+      </p:sp>
+      <p:sp>
+        <p:nvSpPr>
+          <p:cNvPr id="48" name="TextBox 47">
+            <a:extLst>
+              <a:ext uri="{FF2B5EF4-FFF2-40B4-BE49-F238E27FC236}">
+                <a16:creationId xmlns:a16="http://schemas.microsoft.com/office/drawing/2014/main" id="{E1B3016F-423B-4567-98CA-2D479E254175}"/>
+              </a:ext>
+            </a:extLst>
+          </p:cNvPr>
+          <p:cNvSpPr txBox="1"/>
+          <p:nvPr/>
+        </p:nvSpPr>
+        <p:spPr>
+          <a:xfrm>
+            <a:off x="567614" y="2264020"/>
+            <a:ext cx="2867712" cy="215444"/>
+          </a:xfrm>
+          <a:prstGeom prst="rect">
+            <a:avLst/>
+          </a:prstGeom>
+          <a:noFill/>
+        </p:spPr>
+        <p:txBody>
+          <a:bodyPr vert="horz" wrap="square" lIns="0" tIns="0" rIns="0" bIns="0" numCol="1" spcCol="288000" rtlCol="0" anchor="t" anchorCtr="0">
+            <a:spAutoFit/>
+          </a:bodyPr>
+          <a:lstStyle/>
+          <a:p>
+            <a:pPr algn="ctr">
+              <a:spcBef>
+                <a:spcPts val="0"/>
+              </a:spcBef>
+              <a:spcAft>
+                <a:spcPts val="600"/>
+              </a:spcAft>
+            </a:pPr>
+            <a:r>
+              <a:rPr lang="en-GB" sz="1400" dirty="0">
+                <a:solidFill>
+                  <a:schemeClr val="tx2"/>
+                </a:solidFill>
+                <a:latin typeface="Source Sans Pro Light" charset="0"/>
+                <a:ea typeface="Source Sans Pro Light" charset="0"/>
+                <a:cs typeface="Source Sans Pro Light" charset="0"/>
+              </a:rPr>
+              <a:t>Installs the Feature</a:t>
+            </a:r>
+            <a:endParaRPr lang="en-GB" sz="1400" b="0" i="0" spc="0" dirty="0">
+              <a:ln>
+                <a:noFill/>
+              </a:ln>
+              <a:solidFill>
+                <a:schemeClr val="tx2"/>
+              </a:solidFill>
+              <a:latin typeface="Source Sans Pro Light" charset="0"/>
+              <a:ea typeface="Source Sans Pro Light" charset="0"/>
+              <a:cs typeface="Source Sans Pro Light" charset="0"/>
+            </a:endParaRPr>
+          </a:p>
+        </p:txBody>
+      </p:sp>
+      <p:sp>
+        <p:nvSpPr>
+          <p:cNvPr id="57" name="TextBox 56">
+            <a:extLst>
+              <a:ext uri="{FF2B5EF4-FFF2-40B4-BE49-F238E27FC236}">
+                <a16:creationId xmlns:a16="http://schemas.microsoft.com/office/drawing/2014/main" id="{D51929A3-6FDF-43A7-8AAD-DF12596DB153}"/>
+              </a:ext>
+            </a:extLst>
+          </p:cNvPr>
+          <p:cNvSpPr txBox="1"/>
+          <p:nvPr/>
+        </p:nvSpPr>
+        <p:spPr>
+          <a:xfrm>
+            <a:off x="567614" y="2824438"/>
+            <a:ext cx="2867712" cy="430887"/>
+          </a:xfrm>
+          <a:prstGeom prst="rect">
+            <a:avLst/>
+          </a:prstGeom>
+          <a:noFill/>
+        </p:spPr>
+        <p:txBody>
+          <a:bodyPr vert="horz" wrap="square" lIns="0" tIns="0" rIns="0" bIns="0" numCol="1" spcCol="288000" rtlCol="0" anchor="t" anchorCtr="0">
+            <a:spAutoFit/>
+          </a:bodyPr>
+          <a:lstStyle/>
+          <a:p>
+            <a:pPr algn="ctr">
+              <a:spcBef>
+                <a:spcPts val="0"/>
+              </a:spcBef>
+              <a:spcAft>
+                <a:spcPts val="600"/>
+              </a:spcAft>
+            </a:pPr>
+            <a:r>
+              <a:rPr lang="en-GB" sz="1400" dirty="0">
+                <a:solidFill>
+                  <a:schemeClr val="tx2"/>
+                </a:solidFill>
+                <a:latin typeface="Source Sans Pro Light" charset="0"/>
+                <a:ea typeface="Source Sans Pro Light" charset="0"/>
+                <a:cs typeface="Source Sans Pro Light" charset="0"/>
+              </a:rPr>
+              <a:t>Reads permission file from the </a:t>
+            </a:r>
+            <a:r>
+              <a:rPr lang="en-GB" sz="1400" dirty="0" err="1">
+                <a:solidFill>
+                  <a:schemeClr val="tx2"/>
+                </a:solidFill>
+                <a:latin typeface="Source Sans Pro Light" charset="0"/>
+                <a:ea typeface="Source Sans Pro Light" charset="0"/>
+                <a:cs typeface="Source Sans Pro Light" charset="0"/>
+              </a:rPr>
+              <a:t>Feture</a:t>
+            </a:r>
+            <a:r>
+              <a:rPr lang="en-GB" sz="1400" dirty="0">
+                <a:solidFill>
+                  <a:schemeClr val="tx2"/>
+                </a:solidFill>
+                <a:latin typeface="Source Sans Pro Light" charset="0"/>
+                <a:ea typeface="Source Sans Pro Light" charset="0"/>
+                <a:cs typeface="Source Sans Pro Light" charset="0"/>
+              </a:rPr>
+              <a:t> resources</a:t>
+            </a:r>
+            <a:endParaRPr lang="en-GB" sz="1400" b="0" i="0" spc="0" dirty="0">
+              <a:ln>
+                <a:noFill/>
+              </a:ln>
+              <a:solidFill>
+                <a:schemeClr val="tx2"/>
+              </a:solidFill>
+              <a:latin typeface="Source Sans Pro Light" charset="0"/>
+              <a:ea typeface="Source Sans Pro Light" charset="0"/>
+              <a:cs typeface="Source Sans Pro Light" charset="0"/>
+            </a:endParaRPr>
+          </a:p>
+        </p:txBody>
+      </p:sp>
+      <p:sp>
+        <p:nvSpPr>
+          <p:cNvPr id="59" name="TextBox 58">
+            <a:extLst>
+              <a:ext uri="{FF2B5EF4-FFF2-40B4-BE49-F238E27FC236}">
+                <a16:creationId xmlns:a16="http://schemas.microsoft.com/office/drawing/2014/main" id="{8993DF7B-6C6C-48E6-BA39-8AA92AE56D0B}"/>
+              </a:ext>
+            </a:extLst>
+          </p:cNvPr>
+          <p:cNvSpPr txBox="1"/>
+          <p:nvPr/>
+        </p:nvSpPr>
+        <p:spPr>
+          <a:xfrm>
+            <a:off x="567614" y="3729353"/>
+            <a:ext cx="2867712" cy="430887"/>
+          </a:xfrm>
+          <a:prstGeom prst="rect">
+            <a:avLst/>
+          </a:prstGeom>
+          <a:noFill/>
+        </p:spPr>
+        <p:txBody>
+          <a:bodyPr vert="horz" wrap="square" lIns="0" tIns="0" rIns="0" bIns="0" numCol="1" spcCol="288000" rtlCol="0" anchor="t" anchorCtr="0">
+            <a:spAutoFit/>
+          </a:bodyPr>
+          <a:lstStyle/>
+          <a:p>
+            <a:pPr algn="ctr">
+              <a:spcBef>
+                <a:spcPts val="0"/>
+              </a:spcBef>
+              <a:spcAft>
+                <a:spcPts val="600"/>
+              </a:spcAft>
+            </a:pPr>
+            <a:r>
+              <a:rPr lang="en-GB" sz="1400" dirty="0">
+                <a:solidFill>
+                  <a:schemeClr val="tx2"/>
+                </a:solidFill>
+                <a:latin typeface="Source Sans Pro Light" charset="0"/>
+                <a:ea typeface="Source Sans Pro Light" charset="0"/>
+                <a:cs typeface="Source Sans Pro Light" charset="0"/>
+              </a:rPr>
+              <a:t>Parses permissions and add them to the authorized map</a:t>
+            </a:r>
+          </a:p>
+        </p:txBody>
+      </p:sp>
+      <p:sp>
+        <p:nvSpPr>
+          <p:cNvPr id="62" name="TextBox 61">
+            <a:extLst>
+              <a:ext uri="{FF2B5EF4-FFF2-40B4-BE49-F238E27FC236}">
+                <a16:creationId xmlns:a16="http://schemas.microsoft.com/office/drawing/2014/main" id="{1727AA9D-E3EB-430D-AA94-E51CEA757ECE}"/>
+              </a:ext>
+            </a:extLst>
+          </p:cNvPr>
+          <p:cNvSpPr txBox="1"/>
+          <p:nvPr/>
+        </p:nvSpPr>
+        <p:spPr>
+          <a:xfrm>
+            <a:off x="7200352" y="2264020"/>
+            <a:ext cx="2875492" cy="215444"/>
+          </a:xfrm>
+          <a:prstGeom prst="rect">
+            <a:avLst/>
+          </a:prstGeom>
+          <a:noFill/>
+        </p:spPr>
+        <p:txBody>
+          <a:bodyPr vert="horz" wrap="square" lIns="0" tIns="0" rIns="0" bIns="0" numCol="1" spcCol="288000" rtlCol="0" anchor="t" anchorCtr="0">
+            <a:spAutoFit/>
+          </a:bodyPr>
+          <a:lstStyle/>
+          <a:p>
+            <a:pPr algn="ctr">
+              <a:spcBef>
+                <a:spcPts val="0"/>
+              </a:spcBef>
+              <a:spcAft>
+                <a:spcPts val="600"/>
+              </a:spcAft>
+            </a:pPr>
+            <a:r>
+              <a:rPr lang="en-GB" sz="1400" dirty="0">
+                <a:solidFill>
+                  <a:schemeClr val="tx2"/>
+                </a:solidFill>
+                <a:latin typeface="Source Sans Pro Light" charset="0"/>
+                <a:ea typeface="Source Sans Pro Light" charset="0"/>
+                <a:cs typeface="Source Sans Pro Light" charset="0"/>
+              </a:rPr>
+              <a:t>Uninstalls the Feature</a:t>
+            </a:r>
+            <a:endParaRPr lang="en-GB" sz="1400" b="0" i="0" spc="0" dirty="0">
+              <a:ln>
+                <a:noFill/>
+              </a:ln>
+              <a:solidFill>
+                <a:schemeClr val="tx2"/>
+              </a:solidFill>
+              <a:latin typeface="Source Sans Pro Light" charset="0"/>
+              <a:ea typeface="Source Sans Pro Light" charset="0"/>
+              <a:cs typeface="Source Sans Pro Light" charset="0"/>
+            </a:endParaRPr>
+          </a:p>
+        </p:txBody>
+      </p:sp>
+      <p:sp>
+        <p:nvSpPr>
+          <p:cNvPr id="70" name="TextBox 69">
+            <a:extLst>
+              <a:ext uri="{FF2B5EF4-FFF2-40B4-BE49-F238E27FC236}">
+                <a16:creationId xmlns:a16="http://schemas.microsoft.com/office/drawing/2014/main" id="{D6839318-B695-4DC7-B229-8E3682D299E2}"/>
+              </a:ext>
+            </a:extLst>
+          </p:cNvPr>
+          <p:cNvSpPr txBox="1"/>
+          <p:nvPr/>
+        </p:nvSpPr>
+        <p:spPr>
+          <a:xfrm>
+            <a:off x="7196485" y="2874176"/>
+            <a:ext cx="2875492" cy="215444"/>
+          </a:xfrm>
+          <a:prstGeom prst="rect">
+            <a:avLst/>
+          </a:prstGeom>
+          <a:noFill/>
+        </p:spPr>
+        <p:txBody>
+          <a:bodyPr vert="horz" wrap="square" lIns="0" tIns="0" rIns="0" bIns="0" numCol="1" spcCol="288000" rtlCol="0" anchor="t" anchorCtr="0">
+            <a:spAutoFit/>
+          </a:bodyPr>
+          <a:lstStyle/>
+          <a:p>
+            <a:pPr algn="ctr">
+              <a:spcBef>
+                <a:spcPts val="0"/>
+              </a:spcBef>
+              <a:spcAft>
+                <a:spcPts val="600"/>
+              </a:spcAft>
+            </a:pPr>
+            <a:r>
+              <a:rPr lang="en-GB" sz="1400" dirty="0" err="1">
+                <a:solidFill>
+                  <a:schemeClr val="tx2"/>
+                </a:solidFill>
+                <a:latin typeface="Source Sans Pro Light" charset="0"/>
+                <a:ea typeface="Source Sans Pro Light" charset="0"/>
+                <a:cs typeface="Source Sans Pro Light" charset="0"/>
+              </a:rPr>
+              <a:t>Feature.uninstall</a:t>
+            </a:r>
+            <a:r>
+              <a:rPr lang="en-GB" sz="1400" dirty="0">
+                <a:solidFill>
+                  <a:schemeClr val="tx2"/>
+                </a:solidFill>
+                <a:latin typeface="Source Sans Pro Light" charset="0"/>
+                <a:ea typeface="Source Sans Pro Light" charset="0"/>
+                <a:cs typeface="Source Sans Pro Light" charset="0"/>
+              </a:rPr>
+              <a:t>() is called </a:t>
+            </a:r>
+            <a:endParaRPr lang="en-GB" sz="1400" b="0" i="0" spc="0" dirty="0">
+              <a:ln>
+                <a:noFill/>
+              </a:ln>
+              <a:solidFill>
+                <a:schemeClr val="tx2"/>
+              </a:solidFill>
+              <a:latin typeface="Source Sans Pro Light" charset="0"/>
+              <a:ea typeface="Source Sans Pro Light" charset="0"/>
+              <a:cs typeface="Source Sans Pro Light" charset="0"/>
+            </a:endParaRPr>
+          </a:p>
+        </p:txBody>
+      </p:sp>
+      <p:sp>
+        <p:nvSpPr>
+          <p:cNvPr id="74" name="TextBox 73">
+            <a:extLst>
+              <a:ext uri="{FF2B5EF4-FFF2-40B4-BE49-F238E27FC236}">
+                <a16:creationId xmlns:a16="http://schemas.microsoft.com/office/drawing/2014/main" id="{9C471173-ACDB-4019-A19B-6ED79DEED2FD}"/>
+              </a:ext>
+            </a:extLst>
+          </p:cNvPr>
+          <p:cNvSpPr txBox="1"/>
+          <p:nvPr/>
+        </p:nvSpPr>
+        <p:spPr>
+          <a:xfrm>
+            <a:off x="7200375" y="3789041"/>
+            <a:ext cx="2867712" cy="430887"/>
+          </a:xfrm>
+          <a:prstGeom prst="rect">
+            <a:avLst/>
+          </a:prstGeom>
+          <a:noFill/>
+        </p:spPr>
+        <p:txBody>
+          <a:bodyPr vert="horz" wrap="square" lIns="0" tIns="0" rIns="0" bIns="0" numCol="1" spcCol="288000" rtlCol="0" anchor="t" anchorCtr="0">
+            <a:spAutoFit/>
+          </a:bodyPr>
+          <a:lstStyle/>
+          <a:p>
+            <a:pPr algn="ctr">
+              <a:spcBef>
+                <a:spcPts val="0"/>
+              </a:spcBef>
+              <a:spcAft>
+                <a:spcPts val="600"/>
+              </a:spcAft>
+            </a:pPr>
+            <a:r>
+              <a:rPr lang="en-GB" sz="1400" dirty="0">
+                <a:solidFill>
+                  <a:schemeClr val="tx2"/>
+                </a:solidFill>
+                <a:latin typeface="Source Sans Pro Light" charset="0"/>
+                <a:ea typeface="Source Sans Pro Light" charset="0"/>
+                <a:cs typeface="Source Sans Pro Light" charset="0"/>
+              </a:rPr>
+              <a:t>Removes cached permissions from the map if it exists</a:t>
+            </a:r>
+          </a:p>
+        </p:txBody>
+      </p:sp>
+      <p:sp>
+        <p:nvSpPr>
+          <p:cNvPr id="78" name="TextBox 77">
+            <a:extLst>
+              <a:ext uri="{FF2B5EF4-FFF2-40B4-BE49-F238E27FC236}">
+                <a16:creationId xmlns:a16="http://schemas.microsoft.com/office/drawing/2014/main" id="{E4FCB521-90AE-47AD-97BB-BE818B2C618E}"/>
+              </a:ext>
+            </a:extLst>
+          </p:cNvPr>
+          <p:cNvSpPr txBox="1"/>
+          <p:nvPr/>
+        </p:nvSpPr>
+        <p:spPr>
+          <a:xfrm>
+            <a:off x="3894341" y="3729352"/>
+            <a:ext cx="2867712" cy="430887"/>
+          </a:xfrm>
+          <a:prstGeom prst="rect">
+            <a:avLst/>
+          </a:prstGeom>
+          <a:noFill/>
+        </p:spPr>
+        <p:txBody>
+          <a:bodyPr vert="horz" wrap="square" lIns="0" tIns="0" rIns="0" bIns="0" numCol="1" spcCol="288000" rtlCol="0" anchor="t" anchorCtr="0">
+            <a:spAutoFit/>
+          </a:bodyPr>
+          <a:lstStyle/>
+          <a:p>
+            <a:pPr algn="ctr">
+              <a:spcBef>
+                <a:spcPts val="0"/>
+              </a:spcBef>
+              <a:spcAft>
+                <a:spcPts val="600"/>
+              </a:spcAft>
+            </a:pPr>
+            <a:r>
+              <a:rPr lang="en-GB" sz="1400" dirty="0">
+                <a:solidFill>
+                  <a:schemeClr val="tx2"/>
+                </a:solidFill>
+                <a:latin typeface="Source Sans Pro Light" charset="0"/>
+                <a:ea typeface="Source Sans Pro Light" charset="0"/>
+                <a:cs typeface="Source Sans Pro Light" charset="0"/>
+              </a:rPr>
+              <a:t>Checks if permission is in the map. If not, throws a </a:t>
+            </a:r>
+            <a:r>
+              <a:rPr lang="en-GB" sz="1400" dirty="0" err="1">
+                <a:solidFill>
+                  <a:schemeClr val="tx2"/>
+                </a:solidFill>
+                <a:latin typeface="Source Sans Pro Light" charset="0"/>
+                <a:ea typeface="Source Sans Pro Light" charset="0"/>
+                <a:cs typeface="Source Sans Pro Light" charset="0"/>
+              </a:rPr>
+              <a:t>SecurityException</a:t>
+            </a:r>
+            <a:endParaRPr lang="en-GB" sz="1400" dirty="0">
+              <a:solidFill>
+                <a:schemeClr val="tx2"/>
+              </a:solidFill>
+              <a:latin typeface="Source Sans Pro Light" charset="0"/>
+              <a:ea typeface="Source Sans Pro Light" charset="0"/>
+              <a:cs typeface="Source Sans Pro Light" charset="0"/>
+            </a:endParaRPr>
           </a:p>
         </p:txBody>
       </p:sp>

</xml_diff>